<commit_message>
added url to slides
</commit_message>
<xml_diff>
--- a/Connected Applications in Azure.pptx
+++ b/Connected Applications in Azure.pptx
@@ -5,29 +5,31 @@
     <p:sldMasterId id="2147483678" r:id="rId1"/>
   </p:sldMasterIdLst>
   <p:notesMasterIdLst>
-    <p:notesMasterId r:id="rId22"/>
+    <p:notesMasterId r:id="rId24"/>
   </p:notesMasterIdLst>
   <p:sldIdLst>
     <p:sldId id="256" r:id="rId2"/>
-    <p:sldId id="257" r:id="rId3"/>
-    <p:sldId id="260" r:id="rId4"/>
-    <p:sldId id="258" r:id="rId5"/>
-    <p:sldId id="261" r:id="rId6"/>
-    <p:sldId id="264" r:id="rId7"/>
-    <p:sldId id="263" r:id="rId8"/>
-    <p:sldId id="265" r:id="rId9"/>
-    <p:sldId id="266" r:id="rId10"/>
-    <p:sldId id="267" r:id="rId11"/>
-    <p:sldId id="268" r:id="rId12"/>
-    <p:sldId id="269" r:id="rId13"/>
-    <p:sldId id="271" r:id="rId14"/>
-    <p:sldId id="262" r:id="rId15"/>
-    <p:sldId id="259" r:id="rId16"/>
-    <p:sldId id="270" r:id="rId17"/>
-    <p:sldId id="272" r:id="rId18"/>
-    <p:sldId id="273" r:id="rId19"/>
-    <p:sldId id="274" r:id="rId20"/>
-    <p:sldId id="275" r:id="rId21"/>
+    <p:sldId id="277" r:id="rId3"/>
+    <p:sldId id="257" r:id="rId4"/>
+    <p:sldId id="260" r:id="rId5"/>
+    <p:sldId id="258" r:id="rId6"/>
+    <p:sldId id="261" r:id="rId7"/>
+    <p:sldId id="264" r:id="rId8"/>
+    <p:sldId id="263" r:id="rId9"/>
+    <p:sldId id="265" r:id="rId10"/>
+    <p:sldId id="266" r:id="rId11"/>
+    <p:sldId id="267" r:id="rId12"/>
+    <p:sldId id="268" r:id="rId13"/>
+    <p:sldId id="269" r:id="rId14"/>
+    <p:sldId id="271" r:id="rId15"/>
+    <p:sldId id="262" r:id="rId16"/>
+    <p:sldId id="259" r:id="rId17"/>
+    <p:sldId id="270" r:id="rId18"/>
+    <p:sldId id="272" r:id="rId19"/>
+    <p:sldId id="273" r:id="rId20"/>
+    <p:sldId id="274" r:id="rId21"/>
+    <p:sldId id="275" r:id="rId22"/>
+    <p:sldId id="276" r:id="rId23"/>
   </p:sldIdLst>
   <p:sldSz cx="12192000" cy="6858000"/>
   <p:notesSz cx="6858000" cy="9144000"/>
@@ -126,6 +128,11 @@
       </a:defRPr>
     </a:lvl9pPr>
   </p:defaultTextStyle>
+  <p:extLst>
+    <p:ext uri="{EFAFB233-063F-42B5-8137-9DF3F51BA10A}">
+      <p15:sldGuideLst xmlns:p15="http://schemas.microsoft.com/office/powerpoint/2012/main"/>
+    </p:ext>
+  </p:extLst>
 </p:presentation>
 </file>
 
@@ -211,7 +218,7 @@
           <a:p>
             <a:fld id="{780C560F-39E6-4548-B684-BD1E318CCD5F}" type="datetimeFigureOut">
               <a:rPr lang="en-US" smtClean="0"/>
-              <a:t>4/22/2017</a:t>
+              <a:t>4/26/2017</a:t>
             </a:fld>
             <a:endParaRPr lang="en-US"/>
           </a:p>
@@ -522,6 +529,90 @@
           <a:bodyPr/>
           <a:lstStyle/>
           <a:p>
+            <a:endParaRPr lang="en-US"/>
+          </a:p>
+        </p:txBody>
+      </p:sp>
+      <p:sp>
+        <p:nvSpPr>
+          <p:cNvPr id="4" name="Slide Number Placeholder 3"/>
+          <p:cNvSpPr>
+            <a:spLocks noGrp="1"/>
+          </p:cNvSpPr>
+          <p:nvPr>
+            <p:ph type="sldNum" sz="quarter" idx="10"/>
+          </p:nvPr>
+        </p:nvSpPr>
+        <p:spPr/>
+        <p:txBody>
+          <a:bodyPr/>
+          <a:lstStyle/>
+          <a:p>
+            <a:fld id="{DBA4B11E-D5EB-484F-A6EA-A47CD5359FA5}" type="slidenum">
+              <a:rPr lang="en-US" smtClean="0"/>
+              <a:t>2</a:t>
+            </a:fld>
+            <a:endParaRPr lang="en-US"/>
+          </a:p>
+        </p:txBody>
+      </p:sp>
+    </p:spTree>
+    <p:extLst>
+      <p:ext uri="{BB962C8B-B14F-4D97-AF65-F5344CB8AC3E}">
+        <p14:creationId xmlns:p14="http://schemas.microsoft.com/office/powerpoint/2010/main" val="2827954515"/>
+      </p:ext>
+    </p:extLst>
+  </p:cSld>
+  <p:clrMapOvr>
+    <a:masterClrMapping/>
+  </p:clrMapOvr>
+</p:notes>
+</file>
+
+<file path=ppt/notesSlides/notesSlide2.xml><?xml version="1.0" encoding="utf-8"?>
+<p:notes xmlns:a="http://schemas.openxmlformats.org/drawingml/2006/main" xmlns:r="http://schemas.openxmlformats.org/officeDocument/2006/relationships" xmlns:p="http://schemas.openxmlformats.org/presentationml/2006/main">
+  <p:cSld>
+    <p:spTree>
+      <p:nvGrpSpPr>
+        <p:cNvPr id="1" name=""/>
+        <p:cNvGrpSpPr/>
+        <p:nvPr/>
+      </p:nvGrpSpPr>
+      <p:grpSpPr>
+        <a:xfrm>
+          <a:off x="0" y="0"/>
+          <a:ext cx="0" cy="0"/>
+          <a:chOff x="0" y="0"/>
+          <a:chExt cx="0" cy="0"/>
+        </a:xfrm>
+      </p:grpSpPr>
+      <p:sp>
+        <p:nvSpPr>
+          <p:cNvPr id="2" name="Slide Image Placeholder 1"/>
+          <p:cNvSpPr>
+            <a:spLocks noGrp="1" noRot="1" noChangeAspect="1"/>
+          </p:cNvSpPr>
+          <p:nvPr>
+            <p:ph type="sldImg"/>
+          </p:nvPr>
+        </p:nvSpPr>
+        <p:spPr/>
+      </p:sp>
+      <p:sp>
+        <p:nvSpPr>
+          <p:cNvPr id="3" name="Notes Placeholder 2"/>
+          <p:cNvSpPr>
+            <a:spLocks noGrp="1"/>
+          </p:cNvSpPr>
+          <p:nvPr>
+            <p:ph type="body" idx="1"/>
+          </p:nvPr>
+        </p:nvSpPr>
+        <p:spPr/>
+        <p:txBody>
+          <a:bodyPr/>
+          <a:lstStyle/>
+          <a:p>
             <a:r>
               <a:rPr lang="en-US" dirty="0"/>
               <a:t>Azure</a:t>
@@ -602,7 +693,7 @@
           <a:p>
             <a:fld id="{01283FAC-A721-45A3-BBDE-EAF2B09B7CD9}" type="slidenum">
               <a:rPr lang="en-US" smtClean="0"/>
-              <a:t>6</a:t>
+              <a:t>7</a:t>
             </a:fld>
             <a:endParaRPr lang="en-US"/>
           </a:p>
@@ -621,7 +712,7 @@
 </p:notes>
 </file>
 
-<file path=ppt/notesSlides/notesSlide2.xml><?xml version="1.0" encoding="utf-8"?>
+<file path=ppt/notesSlides/notesSlide3.xml><?xml version="1.0" encoding="utf-8"?>
 <p:notes xmlns:a="http://schemas.openxmlformats.org/drawingml/2006/main" xmlns:r="http://schemas.openxmlformats.org/officeDocument/2006/relationships" xmlns:p="http://schemas.openxmlformats.org/presentationml/2006/main">
   <p:cSld>
     <p:spTree>
@@ -1695,7 +1786,7 @@
           <a:p>
             <a:fld id="{01283FAC-A721-45A3-BBDE-EAF2B09B7CD9}" type="slidenum">
               <a:rPr lang="en-US" smtClean="0"/>
-              <a:t>15</a:t>
+              <a:t>16</a:t>
             </a:fld>
             <a:endParaRPr lang="en-US"/>
           </a:p>
@@ -1705,6 +1796,90 @@
     <p:extLst>
       <p:ext uri="{BB962C8B-B14F-4D97-AF65-F5344CB8AC3E}">
         <p14:creationId xmlns:p14="http://schemas.microsoft.com/office/powerpoint/2010/main" val="2735181992"/>
+      </p:ext>
+    </p:extLst>
+  </p:cSld>
+  <p:clrMapOvr>
+    <a:masterClrMapping/>
+  </p:clrMapOvr>
+</p:notes>
+</file>
+
+<file path=ppt/notesSlides/notesSlide4.xml><?xml version="1.0" encoding="utf-8"?>
+<p:notes xmlns:a="http://schemas.openxmlformats.org/drawingml/2006/main" xmlns:r="http://schemas.openxmlformats.org/officeDocument/2006/relationships" xmlns:p="http://schemas.openxmlformats.org/presentationml/2006/main">
+  <p:cSld>
+    <p:spTree>
+      <p:nvGrpSpPr>
+        <p:cNvPr id="1" name=""/>
+        <p:cNvGrpSpPr/>
+        <p:nvPr/>
+      </p:nvGrpSpPr>
+      <p:grpSpPr>
+        <a:xfrm>
+          <a:off x="0" y="0"/>
+          <a:ext cx="0" cy="0"/>
+          <a:chOff x="0" y="0"/>
+          <a:chExt cx="0" cy="0"/>
+        </a:xfrm>
+      </p:grpSpPr>
+      <p:sp>
+        <p:nvSpPr>
+          <p:cNvPr id="2" name="Slide Image Placeholder 1"/>
+          <p:cNvSpPr>
+            <a:spLocks noGrp="1" noRot="1" noChangeAspect="1"/>
+          </p:cNvSpPr>
+          <p:nvPr>
+            <p:ph type="sldImg"/>
+          </p:nvPr>
+        </p:nvSpPr>
+        <p:spPr/>
+      </p:sp>
+      <p:sp>
+        <p:nvSpPr>
+          <p:cNvPr id="3" name="Notes Placeholder 2"/>
+          <p:cNvSpPr>
+            <a:spLocks noGrp="1"/>
+          </p:cNvSpPr>
+          <p:nvPr>
+            <p:ph type="body" idx="1"/>
+          </p:nvPr>
+        </p:nvSpPr>
+        <p:spPr/>
+        <p:txBody>
+          <a:bodyPr/>
+          <a:lstStyle/>
+          <a:p>
+            <a:endParaRPr lang="en-US"/>
+          </a:p>
+        </p:txBody>
+      </p:sp>
+      <p:sp>
+        <p:nvSpPr>
+          <p:cNvPr id="4" name="Slide Number Placeholder 3"/>
+          <p:cNvSpPr>
+            <a:spLocks noGrp="1"/>
+          </p:cNvSpPr>
+          <p:nvPr>
+            <p:ph type="sldNum" sz="quarter" idx="10"/>
+          </p:nvPr>
+        </p:nvSpPr>
+        <p:spPr/>
+        <p:txBody>
+          <a:bodyPr/>
+          <a:lstStyle/>
+          <a:p>
+            <a:fld id="{DBA4B11E-D5EB-484F-A6EA-A47CD5359FA5}" type="slidenum">
+              <a:rPr lang="en-US" smtClean="0"/>
+              <a:t>22</a:t>
+            </a:fld>
+            <a:endParaRPr lang="en-US"/>
+          </a:p>
+        </p:txBody>
+      </p:sp>
+    </p:spTree>
+    <p:extLst>
+      <p:ext uri="{BB962C8B-B14F-4D97-AF65-F5344CB8AC3E}">
+        <p14:creationId xmlns:p14="http://schemas.microsoft.com/office/powerpoint/2010/main" val="1464171848"/>
       </p:ext>
     </p:extLst>
   </p:cSld>
@@ -10507,7 +10682,7 @@
           <a:p>
             <a:fld id="{11613321-DEE0-438A-AEA3-5E216A8C8862}" type="datetimeFigureOut">
               <a:rPr lang="en-US" smtClean="0"/>
-              <a:t>4/22/2017</a:t>
+              <a:t>4/26/2017</a:t>
             </a:fld>
             <a:endParaRPr lang="en-US"/>
           </a:p>
@@ -10714,7 +10889,7 @@
           <a:p>
             <a:fld id="{11613321-DEE0-438A-AEA3-5E216A8C8862}" type="datetimeFigureOut">
               <a:rPr lang="en-US" smtClean="0"/>
-              <a:t>4/22/2017</a:t>
+              <a:t>4/26/2017</a:t>
             </a:fld>
             <a:endParaRPr lang="en-US"/>
           </a:p>
@@ -10894,7 +11069,7 @@
           <a:p>
             <a:fld id="{11613321-DEE0-438A-AEA3-5E216A8C8862}" type="datetimeFigureOut">
               <a:rPr lang="en-US" smtClean="0"/>
-              <a:t>4/22/2017</a:t>
+              <a:t>4/26/2017</a:t>
             </a:fld>
             <a:endParaRPr lang="en-US"/>
           </a:p>
@@ -11099,7 +11274,7 @@
           <a:p>
             <a:fld id="{11613321-DEE0-438A-AEA3-5E216A8C8862}" type="datetimeFigureOut">
               <a:rPr lang="en-US" smtClean="0"/>
-              <a:t>4/22/2017</a:t>
+              <a:t>4/26/2017</a:t>
             </a:fld>
             <a:endParaRPr lang="en-US"/>
           </a:p>
@@ -19997,7 +20172,7 @@
           <a:p>
             <a:fld id="{11613321-DEE0-438A-AEA3-5E216A8C8862}" type="datetimeFigureOut">
               <a:rPr lang="en-US" smtClean="0"/>
-              <a:t>4/22/2017</a:t>
+              <a:t>4/26/2017</a:t>
             </a:fld>
             <a:endParaRPr lang="en-US"/>
           </a:p>
@@ -20271,7 +20446,7 @@
           <a:p>
             <a:fld id="{11613321-DEE0-438A-AEA3-5E216A8C8862}" type="datetimeFigureOut">
               <a:rPr lang="en-US" smtClean="0"/>
-              <a:t>4/22/2017</a:t>
+              <a:t>4/26/2017</a:t>
             </a:fld>
             <a:endParaRPr lang="en-US"/>
           </a:p>
@@ -20669,7 +20844,7 @@
           <a:p>
             <a:fld id="{11613321-DEE0-438A-AEA3-5E216A8C8862}" type="datetimeFigureOut">
               <a:rPr lang="en-US" smtClean="0"/>
-              <a:t>4/22/2017</a:t>
+              <a:t>4/26/2017</a:t>
             </a:fld>
             <a:endParaRPr lang="en-US"/>
           </a:p>
@@ -20787,7 +20962,7 @@
           <a:p>
             <a:fld id="{11613321-DEE0-438A-AEA3-5E216A8C8862}" type="datetimeFigureOut">
               <a:rPr lang="en-US" smtClean="0"/>
-              <a:t>4/22/2017</a:t>
+              <a:t>4/26/2017</a:t>
             </a:fld>
             <a:endParaRPr lang="en-US"/>
           </a:p>
@@ -20882,7 +21057,7 @@
           <a:p>
             <a:fld id="{11613321-DEE0-438A-AEA3-5E216A8C8862}" type="datetimeFigureOut">
               <a:rPr lang="en-US" smtClean="0"/>
-              <a:t>4/22/2017</a:t>
+              <a:t>4/26/2017</a:t>
             </a:fld>
             <a:endParaRPr lang="en-US"/>
           </a:p>
@@ -21172,7 +21347,7 @@
           <a:p>
             <a:fld id="{11613321-DEE0-438A-AEA3-5E216A8C8862}" type="datetimeFigureOut">
               <a:rPr lang="en-US" smtClean="0"/>
-              <a:t>4/22/2017</a:t>
+              <a:t>4/26/2017</a:t>
             </a:fld>
             <a:endParaRPr lang="en-US"/>
           </a:p>
@@ -21452,7 +21627,7 @@
           <a:p>
             <a:fld id="{11613321-DEE0-438A-AEA3-5E216A8C8862}" type="datetimeFigureOut">
               <a:rPr lang="en-US" smtClean="0"/>
-              <a:t>4/22/2017</a:t>
+              <a:t>4/26/2017</a:t>
             </a:fld>
             <a:endParaRPr lang="en-US"/>
           </a:p>
@@ -21702,7 +21877,7 @@
           <a:p>
             <a:fld id="{11613321-DEE0-438A-AEA3-5E216A8C8862}" type="datetimeFigureOut">
               <a:rPr lang="en-US" smtClean="0"/>
-              <a:t>4/22/2017</a:t>
+              <a:t>4/26/2017</a:t>
             </a:fld>
             <a:endParaRPr lang="en-US"/>
           </a:p>
@@ -22259,16 +22434,29 @@
           </a:p>
           <a:p>
             <a:r>
-              <a:rPr lang="en-US" dirty="0" err="1"/>
-              <a:t>geoffsnowman.codes</a:t>
+              <a:rPr lang="en-US" dirty="0">
+                <a:hlinkClick r:id="rId2"/>
+              </a:rPr>
+              <a:t>http://geoffsnowman.codes</a:t>
             </a:r>
             <a:endParaRPr lang="en-US" dirty="0"/>
           </a:p>
           <a:p>
             <a:r>
               <a:rPr lang="en-US" dirty="0"/>
-              <a:t>www.architectmysoftware.com</a:t>
+              <a:t>http://github.io/geoffsnowman</a:t>
             </a:r>
+          </a:p>
+          <a:p>
+            <a:r>
+              <a:rPr lang="en-US" dirty="0"/>
+              <a:t>@</a:t>
+            </a:r>
+            <a:r>
+              <a:rPr lang="en-US" dirty="0" err="1"/>
+              <a:t>geoffsnowman</a:t>
+            </a:r>
+            <a:endParaRPr lang="en-US" dirty="0"/>
           </a:p>
         </p:txBody>
       </p:sp>
@@ -22286,6 +22474,94 @@
 </file>
 
 <file path=ppt/slides/slide10.xml><?xml version="1.0" encoding="utf-8"?>
+<p:sld xmlns:a="http://schemas.openxmlformats.org/drawingml/2006/main" xmlns:r="http://schemas.openxmlformats.org/officeDocument/2006/relationships" xmlns:p="http://schemas.openxmlformats.org/presentationml/2006/main">
+  <p:cSld>
+    <p:spTree>
+      <p:nvGrpSpPr>
+        <p:cNvPr id="1" name=""/>
+        <p:cNvGrpSpPr/>
+        <p:nvPr/>
+      </p:nvGrpSpPr>
+      <p:grpSpPr>
+        <a:xfrm>
+          <a:off x="0" y="0"/>
+          <a:ext cx="0" cy="0"/>
+          <a:chOff x="0" y="0"/>
+          <a:chExt cx="0" cy="0"/>
+        </a:xfrm>
+      </p:grpSpPr>
+      <p:sp>
+        <p:nvSpPr>
+          <p:cNvPr id="2" name="Title 1"/>
+          <p:cNvSpPr>
+            <a:spLocks noGrp="1"/>
+          </p:cNvSpPr>
+          <p:nvPr>
+            <p:ph type="title"/>
+          </p:nvPr>
+        </p:nvSpPr>
+        <p:spPr/>
+        <p:txBody>
+          <a:bodyPr/>
+          <a:lstStyle/>
+          <a:p>
+            <a:r>
+              <a:rPr lang="en-US" dirty="0"/>
+              <a:t>Storage Queues vs Service Bus</a:t>
+            </a:r>
+          </a:p>
+        </p:txBody>
+      </p:sp>
+      <p:sp>
+        <p:nvSpPr>
+          <p:cNvPr id="3" name="Content Placeholder 2"/>
+          <p:cNvSpPr>
+            <a:spLocks noGrp="1"/>
+          </p:cNvSpPr>
+          <p:nvPr>
+            <p:ph idx="1"/>
+          </p:nvPr>
+        </p:nvSpPr>
+        <p:spPr/>
+        <p:txBody>
+          <a:bodyPr/>
+          <a:lstStyle/>
+          <a:p>
+            <a:r>
+              <a:rPr lang="en-US" b="1" dirty="0"/>
+              <a:t>Storage queues</a:t>
+            </a:r>
+            <a:r>
+              <a:rPr lang="en-US" dirty="0"/>
+              <a:t>, which are part of the Azure storage infrastructure, feature a simple REST-based Get/Put/Peek interface, providing reliable, persistent messaging within and between services.</a:t>
+            </a:r>
+          </a:p>
+          <a:p>
+            <a:r>
+              <a:rPr lang="en-US" b="1" dirty="0"/>
+              <a:t>Service Bus queues</a:t>
+            </a:r>
+            <a:r>
+              <a:rPr lang="en-US" dirty="0"/>
+              <a:t> are part of a broader Azure messaging infrastructure that supports queuing as well as publish/subscribe, and more advanced integration patterns.</a:t>
+            </a:r>
+          </a:p>
+        </p:txBody>
+      </p:sp>
+    </p:spTree>
+    <p:extLst>
+      <p:ext uri="{BB962C8B-B14F-4D97-AF65-F5344CB8AC3E}">
+        <p14:creationId xmlns:p14="http://schemas.microsoft.com/office/powerpoint/2010/main" val="4044975941"/>
+      </p:ext>
+    </p:extLst>
+  </p:cSld>
+  <p:clrMapOvr>
+    <a:masterClrMapping/>
+  </p:clrMapOvr>
+</p:sld>
+</file>
+
+<file path=ppt/slides/slide11.xml><?xml version="1.0" encoding="utf-8"?>
 <p:sld xmlns:a="http://schemas.openxmlformats.org/drawingml/2006/main" xmlns:r="http://schemas.openxmlformats.org/officeDocument/2006/relationships" xmlns:p="http://schemas.openxmlformats.org/presentationml/2006/main">
   <p:cSld>
     <p:spTree>
@@ -22376,7 +22652,7 @@
 </p:sld>
 </file>
 
-<file path=ppt/slides/slide11.xml><?xml version="1.0" encoding="utf-8"?>
+<file path=ppt/slides/slide12.xml><?xml version="1.0" encoding="utf-8"?>
 <p:sld xmlns:a="http://schemas.openxmlformats.org/drawingml/2006/main" xmlns:r="http://schemas.openxmlformats.org/officeDocument/2006/relationships" xmlns:p="http://schemas.openxmlformats.org/presentationml/2006/main">
   <p:cSld>
     <p:spTree>
@@ -22499,7 +22775,7 @@
 </p:sld>
 </file>
 
-<file path=ppt/slides/slide12.xml><?xml version="1.0" encoding="utf-8"?>
+<file path=ppt/slides/slide13.xml><?xml version="1.0" encoding="utf-8"?>
 <p:sld xmlns:a="http://schemas.openxmlformats.org/drawingml/2006/main" xmlns:r="http://schemas.openxmlformats.org/officeDocument/2006/relationships" xmlns:p="http://schemas.openxmlformats.org/presentationml/2006/main">
   <p:cSld>
     <p:spTree>
@@ -22614,7 +22890,7 @@
 </p:sld>
 </file>
 
-<file path=ppt/slides/slide13.xml><?xml version="1.0" encoding="utf-8"?>
+<file path=ppt/slides/slide14.xml><?xml version="1.0" encoding="utf-8"?>
 <p:sld xmlns:a="http://schemas.openxmlformats.org/drawingml/2006/main" xmlns:r="http://schemas.openxmlformats.org/officeDocument/2006/relationships" xmlns:p="http://schemas.openxmlformats.org/presentationml/2006/main">
   <p:cSld>
     <p:spTree>
@@ -24406,7 +24682,7 @@
 </p:sld>
 </file>
 
-<file path=ppt/slides/slide14.xml><?xml version="1.0" encoding="utf-8"?>
+<file path=ppt/slides/slide15.xml><?xml version="1.0" encoding="utf-8"?>
 <p:sld xmlns:a="http://schemas.openxmlformats.org/drawingml/2006/main" xmlns:r="http://schemas.openxmlformats.org/officeDocument/2006/relationships" xmlns:p="http://schemas.openxmlformats.org/presentationml/2006/main">
   <p:cSld>
     <p:spTree>
@@ -24477,7 +24753,7 @@
 </p:sld>
 </file>
 
-<file path=ppt/slides/slide15.xml><?xml version="1.0" encoding="utf-8"?>
+<file path=ppt/slides/slide16.xml><?xml version="1.0" encoding="utf-8"?>
 <p:sld xmlns:a="http://schemas.openxmlformats.org/drawingml/2006/main" xmlns:r="http://schemas.openxmlformats.org/officeDocument/2006/relationships" xmlns:p="http://schemas.openxmlformats.org/presentationml/2006/main">
   <p:cSld>
     <p:spTree>
@@ -33020,7 +33296,7 @@
 </p:sld>
 </file>
 
-<file path=ppt/slides/slide16.xml><?xml version="1.0" encoding="utf-8"?>
+<file path=ppt/slides/slide17.xml><?xml version="1.0" encoding="utf-8"?>
 <p:sld xmlns:a="http://schemas.openxmlformats.org/drawingml/2006/main" xmlns:r="http://schemas.openxmlformats.org/officeDocument/2006/relationships" xmlns:p="http://schemas.openxmlformats.org/presentationml/2006/main">
   <p:cSld>
     <p:spTree>
@@ -33120,7 +33396,7 @@
 </p:sld>
 </file>
 
-<file path=ppt/slides/slide17.xml><?xml version="1.0" encoding="utf-8"?>
+<file path=ppt/slides/slide18.xml><?xml version="1.0" encoding="utf-8"?>
 <p:sld xmlns:a="http://schemas.openxmlformats.org/drawingml/2006/main" xmlns:r="http://schemas.openxmlformats.org/officeDocument/2006/relationships" xmlns:p="http://schemas.openxmlformats.org/presentationml/2006/main">
   <p:cSld>
     <p:spTree>
@@ -33203,7 +33479,7 @@
 </p:sld>
 </file>
 
-<file path=ppt/slides/slide18.xml><?xml version="1.0" encoding="utf-8"?>
+<file path=ppt/slides/slide19.xml><?xml version="1.0" encoding="utf-8"?>
 <p:sld xmlns:a="http://schemas.openxmlformats.org/drawingml/2006/main" xmlns:r="http://schemas.openxmlformats.org/officeDocument/2006/relationships" xmlns:p="http://schemas.openxmlformats.org/presentationml/2006/main">
   <p:cSld>
     <p:spTree>
@@ -33274,7 +33550,96 @@
 </p:sld>
 </file>
 
-<file path=ppt/slides/slide19.xml><?xml version="1.0" encoding="utf-8"?>
+<file path=ppt/slides/slide2.xml><?xml version="1.0" encoding="utf-8"?>
+<p:sld xmlns:a="http://schemas.openxmlformats.org/drawingml/2006/main" xmlns:r="http://schemas.openxmlformats.org/officeDocument/2006/relationships" xmlns:p="http://schemas.openxmlformats.org/presentationml/2006/main">
+  <p:cSld>
+    <p:spTree>
+      <p:nvGrpSpPr>
+        <p:cNvPr id="1" name=""/>
+        <p:cNvGrpSpPr/>
+        <p:nvPr/>
+      </p:nvGrpSpPr>
+      <p:grpSpPr>
+        <a:xfrm>
+          <a:off x="0" y="0"/>
+          <a:ext cx="0" cy="0"/>
+          <a:chOff x="0" y="0"/>
+          <a:chExt cx="0" cy="0"/>
+        </a:xfrm>
+      </p:grpSpPr>
+      <p:sp>
+        <p:nvSpPr>
+          <p:cNvPr id="2" name="TextBox 1"/>
+          <p:cNvSpPr txBox="1"/>
+          <p:nvPr/>
+        </p:nvSpPr>
+        <p:spPr>
+          <a:xfrm>
+            <a:off x="1002323" y="1450731"/>
+            <a:ext cx="10168168" cy="3416320"/>
+          </a:xfrm>
+          <a:prstGeom prst="rect">
+            <a:avLst/>
+          </a:prstGeom>
+          <a:noFill/>
+        </p:spPr>
+        <p:txBody>
+          <a:bodyPr wrap="none" rtlCol="0">
+            <a:spAutoFit/>
+          </a:bodyPr>
+          <a:lstStyle/>
+          <a:p>
+            <a:r>
+              <a:rPr lang="en-US" sz="5400" dirty="0">
+                <a:latin typeface="Adobe Myungjo Std M" panose="02020600000000000000" pitchFamily="18" charset="-128"/>
+                <a:ea typeface="Adobe Myungjo Std M" panose="02020600000000000000" pitchFamily="18" charset="-128"/>
+              </a:rPr>
+              <a:t>For source of my sample</a:t>
+            </a:r>
+          </a:p>
+          <a:p>
+            <a:r>
+              <a:rPr lang="en-US" sz="5400" dirty="0">
+                <a:latin typeface="Adobe Myungjo Std M" panose="02020600000000000000" pitchFamily="18" charset="-128"/>
+                <a:ea typeface="Adobe Myungjo Std M" panose="02020600000000000000" pitchFamily="18" charset="-128"/>
+              </a:rPr>
+              <a:t>projects and more resources </a:t>
+            </a:r>
+          </a:p>
+          <a:p>
+            <a:r>
+              <a:rPr lang="en-US" sz="5400" dirty="0">
+                <a:latin typeface="Adobe Myungjo Std M" panose="02020600000000000000" pitchFamily="18" charset="-128"/>
+                <a:ea typeface="Adobe Myungjo Std M" panose="02020600000000000000" pitchFamily="18" charset="-128"/>
+              </a:rPr>
+              <a:t>for this presentation, see </a:t>
+            </a:r>
+          </a:p>
+          <a:p>
+            <a:r>
+              <a:rPr lang="en-US" sz="5400" dirty="0">
+                <a:latin typeface="Adobe Myungjo Std M" panose="02020600000000000000" pitchFamily="18" charset="-128"/>
+                <a:ea typeface="Adobe Myungjo Std M" panose="02020600000000000000" pitchFamily="18" charset="-128"/>
+              </a:rPr>
+              <a:t>http://geoffsnowman.codes</a:t>
+            </a:r>
+          </a:p>
+        </p:txBody>
+      </p:sp>
+    </p:spTree>
+    <p:extLst>
+      <p:ext uri="{BB962C8B-B14F-4D97-AF65-F5344CB8AC3E}">
+        <p14:creationId xmlns:p14="http://schemas.microsoft.com/office/powerpoint/2010/main" val="816656228"/>
+      </p:ext>
+    </p:extLst>
+  </p:cSld>
+  <p:clrMapOvr>
+    <a:masterClrMapping/>
+  </p:clrMapOvr>
+</p:sld>
+</file>
+
+<file path=ppt/slides/slide20.xml><?xml version="1.0" encoding="utf-8"?>
 <p:sld xmlns:a="http://schemas.openxmlformats.org/drawingml/2006/main" xmlns:r="http://schemas.openxmlformats.org/officeDocument/2006/relationships" xmlns:p="http://schemas.openxmlformats.org/presentationml/2006/main">
   <p:cSld>
     <p:spTree>
@@ -33360,105 +33725,7 @@
 </p:sld>
 </file>
 
-<file path=ppt/slides/slide2.xml><?xml version="1.0" encoding="utf-8"?>
-<p:sld xmlns:a="http://schemas.openxmlformats.org/drawingml/2006/main" xmlns:r="http://schemas.openxmlformats.org/officeDocument/2006/relationships" xmlns:p="http://schemas.openxmlformats.org/presentationml/2006/main">
-  <p:cSld>
-    <p:spTree>
-      <p:nvGrpSpPr>
-        <p:cNvPr id="1" name=""/>
-        <p:cNvGrpSpPr/>
-        <p:nvPr/>
-      </p:nvGrpSpPr>
-      <p:grpSpPr>
-        <a:xfrm>
-          <a:off x="0" y="0"/>
-          <a:ext cx="0" cy="0"/>
-          <a:chOff x="0" y="0"/>
-          <a:chExt cx="0" cy="0"/>
-        </a:xfrm>
-      </p:grpSpPr>
-      <p:sp>
-        <p:nvSpPr>
-          <p:cNvPr id="2" name="Title 1"/>
-          <p:cNvSpPr>
-            <a:spLocks noGrp="1"/>
-          </p:cNvSpPr>
-          <p:nvPr>
-            <p:ph type="title"/>
-          </p:nvPr>
-        </p:nvSpPr>
-        <p:spPr/>
-        <p:txBody>
-          <a:bodyPr/>
-          <a:lstStyle/>
-          <a:p>
-            <a:r>
-              <a:rPr lang="en-US" dirty="0"/>
-              <a:t>Agenda</a:t>
-            </a:r>
-          </a:p>
-        </p:txBody>
-      </p:sp>
-      <p:sp>
-        <p:nvSpPr>
-          <p:cNvPr id="3" name="Content Placeholder 2"/>
-          <p:cNvSpPr>
-            <a:spLocks noGrp="1"/>
-          </p:cNvSpPr>
-          <p:nvPr>
-            <p:ph idx="1"/>
-          </p:nvPr>
-        </p:nvSpPr>
-        <p:spPr/>
-        <p:txBody>
-          <a:bodyPr/>
-          <a:lstStyle/>
-          <a:p>
-            <a:r>
-              <a:rPr lang="en-US" dirty="0"/>
-              <a:t>Azure Queues</a:t>
-            </a:r>
-          </a:p>
-          <a:p>
-            <a:r>
-              <a:rPr lang="en-US" dirty="0"/>
-              <a:t>Azure Logic Application</a:t>
-            </a:r>
-          </a:p>
-          <a:p>
-            <a:r>
-              <a:rPr lang="en-US" dirty="0"/>
-              <a:t>Azure Service Bus</a:t>
-            </a:r>
-          </a:p>
-          <a:p>
-            <a:r>
-              <a:rPr lang="en-US" dirty="0"/>
-              <a:t>Azure Event Hub</a:t>
-            </a:r>
-          </a:p>
-          <a:p>
-            <a:r>
-              <a:rPr lang="en-US" dirty="0"/>
-              <a:t>Azure IoT Hub</a:t>
-            </a:r>
-          </a:p>
-        </p:txBody>
-      </p:sp>
-    </p:spTree>
-    <p:extLst>
-      <p:ext uri="{BB962C8B-B14F-4D97-AF65-F5344CB8AC3E}">
-        <p14:creationId xmlns:p14="http://schemas.microsoft.com/office/powerpoint/2010/main" val="4192166110"/>
-      </p:ext>
-    </p:extLst>
-  </p:cSld>
-  <p:clrMapOvr>
-    <a:masterClrMapping/>
-  </p:clrMapOvr>
-</p:sld>
-</file>
-
-<file path=ppt/slides/slide20.xml><?xml version="1.0" encoding="utf-8"?>
+<file path=ppt/slides/slide21.xml><?xml version="1.0" encoding="utf-8"?>
 <p:sld xmlns:a="http://schemas.openxmlformats.org/drawingml/2006/main" xmlns:r="http://schemas.openxmlformats.org/officeDocument/2006/relationships" xmlns:p="http://schemas.openxmlformats.org/presentationml/2006/main">
   <p:cSld>
     <p:spTree>
@@ -35163,7 +35430,194 @@
 </p:sld>
 </file>
 
+<file path=ppt/slides/slide22.xml><?xml version="1.0" encoding="utf-8"?>
+<p:sld xmlns:a="http://schemas.openxmlformats.org/drawingml/2006/main" xmlns:r="http://schemas.openxmlformats.org/officeDocument/2006/relationships" xmlns:p="http://schemas.openxmlformats.org/presentationml/2006/main">
+  <p:cSld>
+    <p:spTree>
+      <p:nvGrpSpPr>
+        <p:cNvPr id="1" name=""/>
+        <p:cNvGrpSpPr/>
+        <p:nvPr/>
+      </p:nvGrpSpPr>
+      <p:grpSpPr>
+        <a:xfrm>
+          <a:off x="0" y="0"/>
+          <a:ext cx="0" cy="0"/>
+          <a:chOff x="0" y="0"/>
+          <a:chExt cx="0" cy="0"/>
+        </a:xfrm>
+      </p:grpSpPr>
+      <p:sp>
+        <p:nvSpPr>
+          <p:cNvPr id="2" name="TextBox 1"/>
+          <p:cNvSpPr txBox="1"/>
+          <p:nvPr/>
+        </p:nvSpPr>
+        <p:spPr>
+          <a:xfrm>
+            <a:off x="1002323" y="1450731"/>
+            <a:ext cx="10168168" cy="3416320"/>
+          </a:xfrm>
+          <a:prstGeom prst="rect">
+            <a:avLst/>
+          </a:prstGeom>
+          <a:noFill/>
+        </p:spPr>
+        <p:txBody>
+          <a:bodyPr wrap="none" rtlCol="0">
+            <a:spAutoFit/>
+          </a:bodyPr>
+          <a:lstStyle/>
+          <a:p>
+            <a:r>
+              <a:rPr lang="en-US" sz="5400" dirty="0">
+                <a:latin typeface="Adobe Myungjo Std M" panose="02020600000000000000" pitchFamily="18" charset="-128"/>
+                <a:ea typeface="Adobe Myungjo Std M" panose="02020600000000000000" pitchFamily="18" charset="-128"/>
+              </a:rPr>
+              <a:t>For source of my sample</a:t>
+            </a:r>
+          </a:p>
+          <a:p>
+            <a:r>
+              <a:rPr lang="en-US" sz="5400" dirty="0">
+                <a:latin typeface="Adobe Myungjo Std M" panose="02020600000000000000" pitchFamily="18" charset="-128"/>
+                <a:ea typeface="Adobe Myungjo Std M" panose="02020600000000000000" pitchFamily="18" charset="-128"/>
+              </a:rPr>
+              <a:t>projects and more resources </a:t>
+            </a:r>
+          </a:p>
+          <a:p>
+            <a:r>
+              <a:rPr lang="en-US" sz="5400" dirty="0">
+                <a:latin typeface="Adobe Myungjo Std M" panose="02020600000000000000" pitchFamily="18" charset="-128"/>
+                <a:ea typeface="Adobe Myungjo Std M" panose="02020600000000000000" pitchFamily="18" charset="-128"/>
+              </a:rPr>
+              <a:t>for this presentation, see </a:t>
+            </a:r>
+          </a:p>
+          <a:p>
+            <a:r>
+              <a:rPr lang="en-US" sz="5400" dirty="0">
+                <a:latin typeface="Adobe Myungjo Std M" panose="02020600000000000000" pitchFamily="18" charset="-128"/>
+                <a:ea typeface="Adobe Myungjo Std M" panose="02020600000000000000" pitchFamily="18" charset="-128"/>
+              </a:rPr>
+              <a:t>http://geoffsnowman.codes</a:t>
+            </a:r>
+          </a:p>
+        </p:txBody>
+      </p:sp>
+    </p:spTree>
+    <p:extLst>
+      <p:ext uri="{BB962C8B-B14F-4D97-AF65-F5344CB8AC3E}">
+        <p14:creationId xmlns:p14="http://schemas.microsoft.com/office/powerpoint/2010/main" val="1338221174"/>
+      </p:ext>
+    </p:extLst>
+  </p:cSld>
+  <p:clrMapOvr>
+    <a:masterClrMapping/>
+  </p:clrMapOvr>
+</p:sld>
+</file>
+
 <file path=ppt/slides/slide3.xml><?xml version="1.0" encoding="utf-8"?>
+<p:sld xmlns:a="http://schemas.openxmlformats.org/drawingml/2006/main" xmlns:r="http://schemas.openxmlformats.org/officeDocument/2006/relationships" xmlns:p="http://schemas.openxmlformats.org/presentationml/2006/main">
+  <p:cSld>
+    <p:spTree>
+      <p:nvGrpSpPr>
+        <p:cNvPr id="1" name=""/>
+        <p:cNvGrpSpPr/>
+        <p:nvPr/>
+      </p:nvGrpSpPr>
+      <p:grpSpPr>
+        <a:xfrm>
+          <a:off x="0" y="0"/>
+          <a:ext cx="0" cy="0"/>
+          <a:chOff x="0" y="0"/>
+          <a:chExt cx="0" cy="0"/>
+        </a:xfrm>
+      </p:grpSpPr>
+      <p:sp>
+        <p:nvSpPr>
+          <p:cNvPr id="2" name="Title 1"/>
+          <p:cNvSpPr>
+            <a:spLocks noGrp="1"/>
+          </p:cNvSpPr>
+          <p:nvPr>
+            <p:ph type="title"/>
+          </p:nvPr>
+        </p:nvSpPr>
+        <p:spPr/>
+        <p:txBody>
+          <a:bodyPr/>
+          <a:lstStyle/>
+          <a:p>
+            <a:r>
+              <a:rPr lang="en-US" dirty="0"/>
+              <a:t>Agenda</a:t>
+            </a:r>
+          </a:p>
+        </p:txBody>
+      </p:sp>
+      <p:sp>
+        <p:nvSpPr>
+          <p:cNvPr id="3" name="Content Placeholder 2"/>
+          <p:cNvSpPr>
+            <a:spLocks noGrp="1"/>
+          </p:cNvSpPr>
+          <p:nvPr>
+            <p:ph idx="1"/>
+          </p:nvPr>
+        </p:nvSpPr>
+        <p:spPr/>
+        <p:txBody>
+          <a:bodyPr/>
+          <a:lstStyle/>
+          <a:p>
+            <a:r>
+              <a:rPr lang="en-US" dirty="0"/>
+              <a:t>Azure Queues</a:t>
+            </a:r>
+          </a:p>
+          <a:p>
+            <a:r>
+              <a:rPr lang="en-US" dirty="0"/>
+              <a:t>Azure Logic Application</a:t>
+            </a:r>
+          </a:p>
+          <a:p>
+            <a:r>
+              <a:rPr lang="en-US" dirty="0"/>
+              <a:t>Azure Service Bus</a:t>
+            </a:r>
+          </a:p>
+          <a:p>
+            <a:r>
+              <a:rPr lang="en-US" dirty="0"/>
+              <a:t>Azure Event Hub</a:t>
+            </a:r>
+          </a:p>
+          <a:p>
+            <a:r>
+              <a:rPr lang="en-US" dirty="0"/>
+              <a:t>Azure IoT Hub</a:t>
+            </a:r>
+          </a:p>
+        </p:txBody>
+      </p:sp>
+    </p:spTree>
+    <p:extLst>
+      <p:ext uri="{BB962C8B-B14F-4D97-AF65-F5344CB8AC3E}">
+        <p14:creationId xmlns:p14="http://schemas.microsoft.com/office/powerpoint/2010/main" val="4192166110"/>
+      </p:ext>
+    </p:extLst>
+  </p:cSld>
+  <p:clrMapOvr>
+    <a:masterClrMapping/>
+  </p:clrMapOvr>
+</p:sld>
+</file>
+
+<file path=ppt/slides/slide4.xml><?xml version="1.0" encoding="utf-8"?>
 <p:sld xmlns:a="http://schemas.openxmlformats.org/drawingml/2006/main" xmlns:r="http://schemas.openxmlformats.org/officeDocument/2006/relationships" xmlns:p="http://schemas.openxmlformats.org/presentationml/2006/main">
   <p:cSld>
     <p:spTree>
@@ -35234,7 +35688,7 @@
 </p:sld>
 </file>
 
-<file path=ppt/slides/slide4.xml><?xml version="1.0" encoding="utf-8"?>
+<file path=ppt/slides/slide5.xml><?xml version="1.0" encoding="utf-8"?>
 <p:sld xmlns:a="http://schemas.openxmlformats.org/drawingml/2006/main" xmlns:r="http://schemas.openxmlformats.org/officeDocument/2006/relationships" xmlns:p="http://schemas.openxmlformats.org/presentationml/2006/main">
   <p:cSld>
     <p:spTree>
@@ -35320,7 +35774,7 @@
 </p:sld>
 </file>
 
-<file path=ppt/slides/slide5.xml><?xml version="1.0" encoding="utf-8"?>
+<file path=ppt/slides/slide6.xml><?xml version="1.0" encoding="utf-8"?>
 <p:sld xmlns:a="http://schemas.openxmlformats.org/drawingml/2006/main" xmlns:r="http://schemas.openxmlformats.org/officeDocument/2006/relationships" xmlns:p="http://schemas.openxmlformats.org/presentationml/2006/main">
   <p:cSld>
     <p:spTree>
@@ -35391,7 +35845,7 @@
 </p:sld>
 </file>
 
-<file path=ppt/slides/slide6.xml><?xml version="1.0" encoding="utf-8"?>
+<file path=ppt/slides/slide7.xml><?xml version="1.0" encoding="utf-8"?>
 <p:sld xmlns:a="http://schemas.openxmlformats.org/drawingml/2006/main" xmlns:r="http://schemas.openxmlformats.org/officeDocument/2006/relationships" xmlns:p="http://schemas.openxmlformats.org/presentationml/2006/main">
   <p:cSld>
     <p:spTree>
@@ -35875,7 +36329,7 @@
 </p:sld>
 </file>
 
-<file path=ppt/slides/slide7.xml><?xml version="1.0" encoding="utf-8"?>
+<file path=ppt/slides/slide8.xml><?xml version="1.0" encoding="utf-8"?>
 <p:sld xmlns:a="http://schemas.openxmlformats.org/drawingml/2006/main" xmlns:r="http://schemas.openxmlformats.org/officeDocument/2006/relationships" xmlns:p="http://schemas.openxmlformats.org/presentationml/2006/main">
   <p:cSld>
     <p:spTree>
@@ -35946,7 +36400,7 @@
 </p:sld>
 </file>
 
-<file path=ppt/slides/slide8.xml><?xml version="1.0" encoding="utf-8"?>
+<file path=ppt/slides/slide9.xml><?xml version="1.0" encoding="utf-8"?>
 <p:sld xmlns:a="http://schemas.openxmlformats.org/drawingml/2006/main" xmlns:r="http://schemas.openxmlformats.org/officeDocument/2006/relationships" xmlns:p="http://schemas.openxmlformats.org/presentationml/2006/main">
   <p:cSld>
     <p:spTree>
@@ -36026,94 +36480,6 @@
     <p:extLst>
       <p:ext uri="{BB962C8B-B14F-4D97-AF65-F5344CB8AC3E}">
         <p14:creationId xmlns:p14="http://schemas.microsoft.com/office/powerpoint/2010/main" val="2156407262"/>
-      </p:ext>
-    </p:extLst>
-  </p:cSld>
-  <p:clrMapOvr>
-    <a:masterClrMapping/>
-  </p:clrMapOvr>
-</p:sld>
-</file>
-
-<file path=ppt/slides/slide9.xml><?xml version="1.0" encoding="utf-8"?>
-<p:sld xmlns:a="http://schemas.openxmlformats.org/drawingml/2006/main" xmlns:r="http://schemas.openxmlformats.org/officeDocument/2006/relationships" xmlns:p="http://schemas.openxmlformats.org/presentationml/2006/main">
-  <p:cSld>
-    <p:spTree>
-      <p:nvGrpSpPr>
-        <p:cNvPr id="1" name=""/>
-        <p:cNvGrpSpPr/>
-        <p:nvPr/>
-      </p:nvGrpSpPr>
-      <p:grpSpPr>
-        <a:xfrm>
-          <a:off x="0" y="0"/>
-          <a:ext cx="0" cy="0"/>
-          <a:chOff x="0" y="0"/>
-          <a:chExt cx="0" cy="0"/>
-        </a:xfrm>
-      </p:grpSpPr>
-      <p:sp>
-        <p:nvSpPr>
-          <p:cNvPr id="2" name="Title 1"/>
-          <p:cNvSpPr>
-            <a:spLocks noGrp="1"/>
-          </p:cNvSpPr>
-          <p:nvPr>
-            <p:ph type="title"/>
-          </p:nvPr>
-        </p:nvSpPr>
-        <p:spPr/>
-        <p:txBody>
-          <a:bodyPr/>
-          <a:lstStyle/>
-          <a:p>
-            <a:r>
-              <a:rPr lang="en-US" dirty="0"/>
-              <a:t>Storage Queues vs Service Bus</a:t>
-            </a:r>
-          </a:p>
-        </p:txBody>
-      </p:sp>
-      <p:sp>
-        <p:nvSpPr>
-          <p:cNvPr id="3" name="Content Placeholder 2"/>
-          <p:cNvSpPr>
-            <a:spLocks noGrp="1"/>
-          </p:cNvSpPr>
-          <p:nvPr>
-            <p:ph idx="1"/>
-          </p:nvPr>
-        </p:nvSpPr>
-        <p:spPr/>
-        <p:txBody>
-          <a:bodyPr/>
-          <a:lstStyle/>
-          <a:p>
-            <a:r>
-              <a:rPr lang="en-US" b="1" dirty="0"/>
-              <a:t>Storage queues</a:t>
-            </a:r>
-            <a:r>
-              <a:rPr lang="en-US" dirty="0"/>
-              <a:t>, which are part of the Azure storage infrastructure, feature a simple REST-based Get/Put/Peek interface, providing reliable, persistent messaging within and between services.</a:t>
-            </a:r>
-          </a:p>
-          <a:p>
-            <a:r>
-              <a:rPr lang="en-US" b="1" dirty="0"/>
-              <a:t>Service Bus queues</a:t>
-            </a:r>
-            <a:r>
-              <a:rPr lang="en-US" dirty="0"/>
-              <a:t> are part of a broader Azure messaging infrastructure that supports queuing as well as publish/subscribe, and more advanced integration patterns.</a:t>
-            </a:r>
-          </a:p>
-        </p:txBody>
-      </p:sp>
-    </p:spTree>
-    <p:extLst>
-      <p:ext uri="{BB962C8B-B14F-4D97-AF65-F5344CB8AC3E}">
-        <p14:creationId xmlns:p14="http://schemas.microsoft.com/office/powerpoint/2010/main" val="4044975941"/>
       </p:ext>
     </p:extLst>
   </p:cSld>

</xml_diff>